<commit_message>
feketek gettositasa es annak kovetkezmenyei a huszadik században
</commit_message>
<xml_diff>
--- a/Ppt/Magyar/nah_Id_win.pptx
+++ b/Ppt/Magyar/nah_Id_win.pptx
@@ -17,12 +17,17 @@
     <p:sldId id="264" r:id="rId11"/>
     <p:sldId id="265" r:id="rId12"/>
     <p:sldId id="259" r:id="rId13"/>
-    <p:sldId id="261" r:id="rId14"/>
+    <p:sldId id="283" r:id="rId14"/>
     <p:sldId id="266" r:id="rId15"/>
     <p:sldId id="267" r:id="rId16"/>
-    <p:sldId id="262" r:id="rId17"/>
-    <p:sldId id="281" r:id="rId18"/>
-    <p:sldId id="282" r:id="rId19"/>
+    <p:sldId id="284" r:id="rId17"/>
+    <p:sldId id="285" r:id="rId18"/>
+    <p:sldId id="286" r:id="rId19"/>
+    <p:sldId id="287" r:id="rId20"/>
+    <p:sldId id="288" r:id="rId21"/>
+    <p:sldId id="262" r:id="rId22"/>
+    <p:sldId id="281" r:id="rId23"/>
+    <p:sldId id="282" r:id="rId24"/>
   </p:sldIdLst>
   <p:sldSz cx="12192000" cy="6858000"/>
   <p:notesSz cx="6858000" cy="9144000"/>
@@ -5196,7 +5201,7 @@
           <a:p>
             <a:fld id="{9E255AD8-65B3-4006-AEB5-E49A2474B8DB}" type="datetimeFigureOut">
               <a:rPr lang="hu-HU" smtClean="0"/>
-              <a:t>2024.03.11.</a:t>
+              <a:t>2024.03.19.</a:t>
             </a:fld>
             <a:endParaRPr lang="hu-HU"/>
           </a:p>
@@ -5608,7 +5613,7 @@
           <a:p>
             <a:fld id="{9E255AD8-65B3-4006-AEB5-E49A2474B8DB}" type="datetimeFigureOut">
               <a:rPr lang="hu-HU" smtClean="0"/>
-              <a:t>2024.03.11.</a:t>
+              <a:t>2024.03.19.</a:t>
             </a:fld>
             <a:endParaRPr lang="hu-HU"/>
           </a:p>
@@ -10384,7 +10389,7 @@
           <a:p>
             <a:fld id="{9E255AD8-65B3-4006-AEB5-E49A2474B8DB}" type="datetimeFigureOut">
               <a:rPr lang="hu-HU" smtClean="0"/>
-              <a:t>2024.03.11.</a:t>
+              <a:t>2024.03.19.</a:t>
             </a:fld>
             <a:endParaRPr lang="hu-HU"/>
           </a:p>
@@ -10796,7 +10801,7 @@
           <a:p>
             <a:fld id="{9E255AD8-65B3-4006-AEB5-E49A2474B8DB}" type="datetimeFigureOut">
               <a:rPr lang="hu-HU" smtClean="0"/>
-              <a:t>2024.03.11.</a:t>
+              <a:t>2024.03.19.</a:t>
             </a:fld>
             <a:endParaRPr lang="hu-HU"/>
           </a:p>
@@ -11490,7 +11495,7 @@
           <a:p>
             <a:fld id="{9E255AD8-65B3-4006-AEB5-E49A2474B8DB}" type="datetimeFigureOut">
               <a:rPr lang="hu-HU" smtClean="0"/>
-              <a:t>2024.03.11.</a:t>
+              <a:t>2024.03.19.</a:t>
             </a:fld>
             <a:endParaRPr lang="hu-HU"/>
           </a:p>
@@ -11902,7 +11907,7 @@
           <a:p>
             <a:fld id="{9E255AD8-65B3-4006-AEB5-E49A2474B8DB}" type="datetimeFigureOut">
               <a:rPr lang="hu-HU" smtClean="0"/>
-              <a:t>2024.03.11.</a:t>
+              <a:t>2024.03.19.</a:t>
             </a:fld>
             <a:endParaRPr lang="hu-HU"/>
           </a:p>
@@ -28529,7 +28534,7 @@
           <a:p>
             <a:fld id="{9E255AD8-65B3-4006-AEB5-E49A2474B8DB}" type="datetimeFigureOut">
               <a:rPr lang="hu-HU" smtClean="0"/>
-              <a:t>2024.03.11.</a:t>
+              <a:t>2024.03.19.</a:t>
             </a:fld>
             <a:endParaRPr lang="hu-HU"/>
           </a:p>
@@ -28941,7 +28946,7 @@
           <a:p>
             <a:fld id="{9E255AD8-65B3-4006-AEB5-E49A2474B8DB}" type="datetimeFigureOut">
               <a:rPr lang="hu-HU" smtClean="0"/>
-              <a:t>2024.03.11.</a:t>
+              <a:t>2024.03.19.</a:t>
             </a:fld>
             <a:endParaRPr lang="hu-HU"/>
           </a:p>
@@ -29304,7 +29309,7 @@
             <a:fld id="{B61BEF0D-F0BB-DE4B-95CE-6DB70DBA9567}" type="datetimeFigureOut">
               <a:rPr lang="en-US" smtClean="0"/>
               <a:pPr/>
-              <a:t>3/11/2024</a:t>
+              <a:t>3/19/2024</a:t>
             </a:fld>
             <a:endParaRPr lang="en-US" dirty="0"/>
           </a:p>
@@ -29516,7 +29521,7 @@
           <a:p>
             <a:fld id="{9E255AD8-65B3-4006-AEB5-E49A2474B8DB}" type="datetimeFigureOut">
               <a:rPr lang="hu-HU" smtClean="0"/>
-              <a:t>2024.03.11.</a:t>
+              <a:t>2024.03.19.</a:t>
             </a:fld>
             <a:endParaRPr lang="hu-HU"/>
           </a:p>
@@ -29793,7 +29798,7 @@
             <a:fld id="{B61BEF0D-F0BB-DE4B-95CE-6DB70DBA9567}" type="datetimeFigureOut">
               <a:rPr lang="en-US" smtClean="0"/>
               <a:pPr/>
-              <a:t>3/11/2024</a:t>
+              <a:t>3/19/2024</a:t>
             </a:fld>
             <a:endParaRPr lang="en-US" dirty="0"/>
           </a:p>
@@ -30062,7 +30067,7 @@
             <a:fld id="{B61BEF0D-F0BB-DE4B-95CE-6DB70DBA9567}" type="datetimeFigureOut">
               <a:rPr lang="en-US" smtClean="0"/>
               <a:pPr/>
-              <a:t>3/11/2024</a:t>
+              <a:t>3/19/2024</a:t>
             </a:fld>
             <a:endParaRPr lang="en-US" dirty="0"/>
           </a:p>
@@ -30981,7 +30986,7 @@
           <a:p>
             <a:fld id="{9E255AD8-65B3-4006-AEB5-E49A2474B8DB}" type="datetimeFigureOut">
               <a:rPr lang="hu-HU" smtClean="0"/>
-              <a:t>2024.03.11.</a:t>
+              <a:t>2024.03.19.</a:t>
             </a:fld>
             <a:endParaRPr lang="hu-HU"/>
           </a:p>
@@ -31130,7 +31135,7 @@
             <a:fld id="{B61BEF0D-F0BB-DE4B-95CE-6DB70DBA9567}" type="datetimeFigureOut">
               <a:rPr lang="en-US" smtClean="0"/>
               <a:pPr/>
-              <a:t>3/11/2024</a:t>
+              <a:t>3/19/2024</a:t>
             </a:fld>
             <a:endParaRPr lang="en-US" dirty="0"/>
           </a:p>
@@ -31258,7 +31263,7 @@
             <a:fld id="{B61BEF0D-F0BB-DE4B-95CE-6DB70DBA9567}" type="datetimeFigureOut">
               <a:rPr lang="en-US" smtClean="0"/>
               <a:pPr/>
-              <a:t>3/11/2024</a:t>
+              <a:t>3/19/2024</a:t>
             </a:fld>
             <a:endParaRPr lang="en-US" dirty="0"/>
           </a:p>
@@ -31546,7 +31551,7 @@
             <a:fld id="{B61BEF0D-F0BB-DE4B-95CE-6DB70DBA9567}" type="datetimeFigureOut">
               <a:rPr lang="en-US" smtClean="0"/>
               <a:pPr/>
-              <a:t>3/11/2024</a:t>
+              <a:t>3/19/2024</a:t>
             </a:fld>
             <a:endParaRPr lang="en-US" dirty="0"/>
           </a:p>
@@ -31873,7 +31878,7 @@
             <a:fld id="{B61BEF0D-F0BB-DE4B-95CE-6DB70DBA9567}" type="datetimeFigureOut">
               <a:rPr lang="en-US" smtClean="0"/>
               <a:pPr/>
-              <a:t>3/11/2024</a:t>
+              <a:t>3/19/2024</a:t>
             </a:fld>
             <a:endParaRPr lang="en-US" dirty="0"/>
           </a:p>
@@ -32200,7 +32205,7 @@
             <a:fld id="{B61BEF0D-F0BB-DE4B-95CE-6DB70DBA9567}" type="datetimeFigureOut">
               <a:rPr lang="en-US" smtClean="0"/>
               <a:pPr/>
-              <a:t>3/11/2024</a:t>
+              <a:t>3/19/2024</a:t>
             </a:fld>
             <a:endParaRPr lang="en-US" dirty="0"/>
           </a:p>
@@ -32481,7 +32486,7 @@
             <a:fld id="{B61BEF0D-F0BB-DE4B-95CE-6DB70DBA9567}" type="datetimeFigureOut">
               <a:rPr lang="en-US" smtClean="0"/>
               <a:pPr/>
-              <a:t>3/11/2024</a:t>
+              <a:t>3/19/2024</a:t>
             </a:fld>
             <a:endParaRPr lang="en-US" dirty="0"/>
           </a:p>
@@ -33052,7 +33057,7 @@
             <a:fld id="{B61BEF0D-F0BB-DE4B-95CE-6DB70DBA9567}" type="datetimeFigureOut">
               <a:rPr lang="en-US" smtClean="0"/>
               <a:pPr/>
-              <a:t>3/11/2024</a:t>
+              <a:t>3/19/2024</a:t>
             </a:fld>
             <a:endParaRPr lang="en-US" dirty="0"/>
           </a:p>
@@ -33333,7 +33338,7 @@
             <a:fld id="{B61BEF0D-F0BB-DE4B-95CE-6DB70DBA9567}" type="datetimeFigureOut">
               <a:rPr lang="en-US" smtClean="0"/>
               <a:pPr/>
-              <a:t>3/11/2024</a:t>
+              <a:t>3/19/2024</a:t>
             </a:fld>
             <a:endParaRPr lang="en-US" dirty="0"/>
           </a:p>
@@ -33898,7 +33903,7 @@
             <a:fld id="{B61BEF0D-F0BB-DE4B-95CE-6DB70DBA9567}" type="datetimeFigureOut">
               <a:rPr lang="en-US" smtClean="0"/>
               <a:pPr/>
-              <a:t>3/11/2024</a:t>
+              <a:t>3/19/2024</a:t>
             </a:fld>
             <a:endParaRPr lang="en-US" dirty="0"/>
           </a:p>
@@ -35195,7 +35200,7 @@
             <a:fld id="{B61BEF0D-F0BB-DE4B-95CE-6DB70DBA9567}" type="datetimeFigureOut">
               <a:rPr lang="en-US" smtClean="0"/>
               <a:pPr/>
-              <a:t>3/11/2024</a:t>
+              <a:t>3/19/2024</a:t>
             </a:fld>
             <a:endParaRPr lang="en-US" dirty="0"/>
           </a:p>
@@ -35403,7 +35408,7 @@
             <a:fld id="{B61BEF0D-F0BB-DE4B-95CE-6DB70DBA9567}" type="datetimeFigureOut">
               <a:rPr lang="en-US" smtClean="0"/>
               <a:pPr/>
-              <a:t>3/11/2024</a:t>
+              <a:t>3/19/2024</a:t>
             </a:fld>
             <a:endParaRPr lang="en-US" dirty="0"/>
           </a:p>
@@ -35616,7 +35621,7 @@
             <a:fld id="{B61BEF0D-F0BB-DE4B-95CE-6DB70DBA9567}" type="datetimeFigureOut">
               <a:rPr lang="en-US" smtClean="0"/>
               <a:pPr/>
-              <a:t>3/11/2024</a:t>
+              <a:t>3/19/2024</a:t>
             </a:fld>
             <a:endParaRPr lang="en-US" dirty="0"/>
           </a:p>
@@ -45626,7 +45631,7 @@
             <a:fld id="{B61BEF0D-F0BB-DE4B-95CE-6DB70DBA9567}" type="datetimeFigureOut">
               <a:rPr lang="en-US" dirty="0"/>
               <a:pPr/>
-              <a:t>3/11/2024</a:t>
+              <a:t>3/19/2024</a:t>
             </a:fld>
             <a:endParaRPr lang="en-US" dirty="0"/>
           </a:p>
@@ -46219,6 +46224,521 @@
           <p:cNvPr id="2" name="Cím 1">
             <a:extLst>
               <a:ext uri="{FF2B5EF4-FFF2-40B4-BE49-F238E27FC236}">
+                <a16:creationId xmlns:a16="http://schemas.microsoft.com/office/drawing/2014/main" id="{7F901B5D-9267-4B8F-8174-F28652CE1542}"/>
+              </a:ext>
+            </a:extLst>
+          </p:cNvPr>
+          <p:cNvSpPr>
+            <a:spLocks noGrp="1"/>
+          </p:cNvSpPr>
+          <p:nvPr>
+            <p:ph type="title"/>
+          </p:nvPr>
+        </p:nvSpPr>
+        <p:spPr>
+          <a:xfrm>
+            <a:off x="1424133" y="324587"/>
+            <a:ext cx="9396400" cy="643200"/>
+          </a:xfrm>
+        </p:spPr>
+        <p:txBody>
+          <a:bodyPr/>
+          <a:lstStyle/>
+          <a:p>
+            <a:r>
+              <a:rPr lang="hu-HU" sz="3200" dirty="0">
+                <a:solidFill>
+                  <a:schemeClr val="accent1"/>
+                </a:solidFill>
+              </a:rPr>
+              <a:t>Prototípus</a:t>
+            </a:r>
+          </a:p>
+        </p:txBody>
+      </p:sp>
+      <p:pic>
+        <p:nvPicPr>
+          <p:cNvPr id="5" name="Kép 4">
+            <a:extLst>
+              <a:ext uri="{FF2B5EF4-FFF2-40B4-BE49-F238E27FC236}">
+                <a16:creationId xmlns:a16="http://schemas.microsoft.com/office/drawing/2014/main" id="{97EF8452-0184-4AD3-AD8A-1D0769A88F3D}"/>
+              </a:ext>
+            </a:extLst>
+          </p:cNvPr>
+          <p:cNvPicPr>
+            <a:picLocks noChangeAspect="1"/>
+          </p:cNvPicPr>
+          <p:nvPr/>
+        </p:nvPicPr>
+        <p:blipFill>
+          <a:blip r:embed="rId2">
+            <a:extLst>
+              <a:ext uri="{28A0092B-C50C-407E-A947-70E740481C1C}">
+                <a14:useLocalDpi xmlns:a14="http://schemas.microsoft.com/office/drawing/2010/main" val="0"/>
+              </a:ext>
+            </a:extLst>
+          </a:blip>
+          <a:stretch>
+            <a:fillRect/>
+          </a:stretch>
+        </p:blipFill>
+        <p:spPr>
+          <a:xfrm>
+            <a:off x="2471737" y="1185862"/>
+            <a:ext cx="7248525" cy="4486275"/>
+          </a:xfrm>
+          <a:prstGeom prst="rect">
+            <a:avLst/>
+          </a:prstGeom>
+        </p:spPr>
+      </p:pic>
+    </p:spTree>
+    <p:extLst>
+      <p:ext uri="{BB962C8B-B14F-4D97-AF65-F5344CB8AC3E}">
+        <p14:creationId xmlns:p14="http://schemas.microsoft.com/office/powerpoint/2010/main" val="3355396585"/>
+      </p:ext>
+    </p:extLst>
+  </p:cSld>
+  <p:clrMapOvr>
+    <a:masterClrMapping/>
+  </p:clrMapOvr>
+</p:sld>
+</file>
+
+<file path=ppt/slides/slide11.xml><?xml version="1.0" encoding="utf-8"?>
+<p:sld xmlns:a="http://schemas.openxmlformats.org/drawingml/2006/main" xmlns:r="http://schemas.openxmlformats.org/officeDocument/2006/relationships" xmlns:p="http://schemas.openxmlformats.org/presentationml/2006/main">
+  <p:cSld>
+    <p:spTree>
+      <p:nvGrpSpPr>
+        <p:cNvPr id="1" name=""/>
+        <p:cNvGrpSpPr/>
+        <p:nvPr/>
+      </p:nvGrpSpPr>
+      <p:grpSpPr>
+        <a:xfrm>
+          <a:off x="0" y="0"/>
+          <a:ext cx="0" cy="0"/>
+          <a:chOff x="0" y="0"/>
+          <a:chExt cx="0" cy="0"/>
+        </a:xfrm>
+      </p:grpSpPr>
+      <p:sp>
+        <p:nvSpPr>
+          <p:cNvPr id="2" name="Cím 1">
+            <a:extLst>
+              <a:ext uri="{FF2B5EF4-FFF2-40B4-BE49-F238E27FC236}">
+                <a16:creationId xmlns:a16="http://schemas.microsoft.com/office/drawing/2014/main" id="{7F901B5D-9267-4B8F-8174-F28652CE1542}"/>
+              </a:ext>
+            </a:extLst>
+          </p:cNvPr>
+          <p:cNvSpPr>
+            <a:spLocks noGrp="1"/>
+          </p:cNvSpPr>
+          <p:nvPr>
+            <p:ph type="title"/>
+          </p:nvPr>
+        </p:nvSpPr>
+        <p:spPr>
+          <a:xfrm>
+            <a:off x="1424133" y="324587"/>
+            <a:ext cx="9396400" cy="643200"/>
+          </a:xfrm>
+        </p:spPr>
+        <p:txBody>
+          <a:bodyPr/>
+          <a:lstStyle/>
+          <a:p>
+            <a:r>
+              <a:rPr lang="hu-HU" sz="3200" dirty="0">
+                <a:solidFill>
+                  <a:schemeClr val="accent1"/>
+                </a:solidFill>
+              </a:rPr>
+              <a:t>Prototípus</a:t>
+            </a:r>
+          </a:p>
+        </p:txBody>
+      </p:sp>
+      <p:pic>
+        <p:nvPicPr>
+          <p:cNvPr id="4" name="Kép 3">
+            <a:extLst>
+              <a:ext uri="{FF2B5EF4-FFF2-40B4-BE49-F238E27FC236}">
+                <a16:creationId xmlns:a16="http://schemas.microsoft.com/office/drawing/2014/main" id="{089C6787-A5A7-4FF3-8E37-40F4F642F018}"/>
+              </a:ext>
+            </a:extLst>
+          </p:cNvPr>
+          <p:cNvPicPr>
+            <a:picLocks noChangeAspect="1"/>
+          </p:cNvPicPr>
+          <p:nvPr/>
+        </p:nvPicPr>
+        <p:blipFill>
+          <a:blip r:embed="rId2">
+            <a:extLst>
+              <a:ext uri="{28A0092B-C50C-407E-A947-70E740481C1C}">
+                <a14:useLocalDpi xmlns:a14="http://schemas.microsoft.com/office/drawing/2010/main" val="0"/>
+              </a:ext>
+            </a:extLst>
+          </a:blip>
+          <a:stretch>
+            <a:fillRect/>
+          </a:stretch>
+        </p:blipFill>
+        <p:spPr>
+          <a:xfrm>
+            <a:off x="2471737" y="1185862"/>
+            <a:ext cx="7248525" cy="4486275"/>
+          </a:xfrm>
+          <a:prstGeom prst="rect">
+            <a:avLst/>
+          </a:prstGeom>
+        </p:spPr>
+      </p:pic>
+    </p:spTree>
+    <p:extLst>
+      <p:ext uri="{BB962C8B-B14F-4D97-AF65-F5344CB8AC3E}">
+        <p14:creationId xmlns:p14="http://schemas.microsoft.com/office/powerpoint/2010/main" val="3252945101"/>
+      </p:ext>
+    </p:extLst>
+  </p:cSld>
+  <p:clrMapOvr>
+    <a:masterClrMapping/>
+  </p:clrMapOvr>
+</p:sld>
+</file>
+
+<file path=ppt/slides/slide12.xml><?xml version="1.0" encoding="utf-8"?>
+<p:sld xmlns:a="http://schemas.openxmlformats.org/drawingml/2006/main" xmlns:r="http://schemas.openxmlformats.org/officeDocument/2006/relationships" xmlns:p="http://schemas.openxmlformats.org/presentationml/2006/main">
+  <p:cSld>
+    <p:spTree>
+      <p:nvGrpSpPr>
+        <p:cNvPr id="1" name=""/>
+        <p:cNvGrpSpPr/>
+        <p:nvPr/>
+      </p:nvGrpSpPr>
+      <p:grpSpPr>
+        <a:xfrm>
+          <a:off x="0" y="0"/>
+          <a:ext cx="0" cy="0"/>
+          <a:chOff x="0" y="0"/>
+          <a:chExt cx="0" cy="0"/>
+        </a:xfrm>
+      </p:grpSpPr>
+      <p:sp>
+        <p:nvSpPr>
+          <p:cNvPr id="2" name="Cím 1">
+            <a:extLst>
+              <a:ext uri="{FF2B5EF4-FFF2-40B4-BE49-F238E27FC236}">
+                <a16:creationId xmlns:a16="http://schemas.microsoft.com/office/drawing/2014/main" id="{7F901B5D-9267-4B8F-8174-F28652CE1542}"/>
+              </a:ext>
+            </a:extLst>
+          </p:cNvPr>
+          <p:cNvSpPr>
+            <a:spLocks noGrp="1"/>
+          </p:cNvSpPr>
+          <p:nvPr>
+            <p:ph type="title"/>
+          </p:nvPr>
+        </p:nvSpPr>
+        <p:spPr>
+          <a:xfrm>
+            <a:off x="1424133" y="324587"/>
+            <a:ext cx="9396400" cy="643200"/>
+          </a:xfrm>
+        </p:spPr>
+        <p:txBody>
+          <a:bodyPr/>
+          <a:lstStyle/>
+          <a:p>
+            <a:r>
+              <a:rPr lang="hu-HU" sz="3200" dirty="0">
+                <a:solidFill>
+                  <a:schemeClr val="accent1"/>
+                </a:solidFill>
+              </a:rPr>
+              <a:t>Prototípus</a:t>
+            </a:r>
+          </a:p>
+        </p:txBody>
+      </p:sp>
+      <p:pic>
+        <p:nvPicPr>
+          <p:cNvPr id="5" name="Kép 4">
+            <a:extLst>
+              <a:ext uri="{FF2B5EF4-FFF2-40B4-BE49-F238E27FC236}">
+                <a16:creationId xmlns:a16="http://schemas.microsoft.com/office/drawing/2014/main" id="{723AA5BD-E448-4E31-99FF-F07BA513331B}"/>
+              </a:ext>
+            </a:extLst>
+          </p:cNvPr>
+          <p:cNvPicPr>
+            <a:picLocks noChangeAspect="1"/>
+          </p:cNvPicPr>
+          <p:nvPr/>
+        </p:nvPicPr>
+        <p:blipFill>
+          <a:blip r:embed="rId2">
+            <a:extLst>
+              <a:ext uri="{28A0092B-C50C-407E-A947-70E740481C1C}">
+                <a14:useLocalDpi xmlns:a14="http://schemas.microsoft.com/office/drawing/2010/main" val="0"/>
+              </a:ext>
+            </a:extLst>
+          </a:blip>
+          <a:stretch>
+            <a:fillRect/>
+          </a:stretch>
+        </p:blipFill>
+        <p:spPr>
+          <a:xfrm>
+            <a:off x="1338595" y="1298240"/>
+            <a:ext cx="9514810" cy="4261519"/>
+          </a:xfrm>
+          <a:prstGeom prst="rect">
+            <a:avLst/>
+          </a:prstGeom>
+        </p:spPr>
+      </p:pic>
+    </p:spTree>
+    <p:extLst>
+      <p:ext uri="{BB962C8B-B14F-4D97-AF65-F5344CB8AC3E}">
+        <p14:creationId xmlns:p14="http://schemas.microsoft.com/office/powerpoint/2010/main" val="66380738"/>
+      </p:ext>
+    </p:extLst>
+  </p:cSld>
+  <p:clrMapOvr>
+    <a:masterClrMapping/>
+  </p:clrMapOvr>
+</p:sld>
+</file>
+
+<file path=ppt/slides/slide13.xml><?xml version="1.0" encoding="utf-8"?>
+<p:sld xmlns:a="http://schemas.openxmlformats.org/drawingml/2006/main" xmlns:r="http://schemas.openxmlformats.org/officeDocument/2006/relationships" xmlns:p="http://schemas.openxmlformats.org/presentationml/2006/main">
+  <p:cSld>
+    <p:spTree>
+      <p:nvGrpSpPr>
+        <p:cNvPr id="1" name=""/>
+        <p:cNvGrpSpPr/>
+        <p:nvPr/>
+      </p:nvGrpSpPr>
+      <p:grpSpPr>
+        <a:xfrm>
+          <a:off x="0" y="0"/>
+          <a:ext cx="0" cy="0"/>
+          <a:chOff x="0" y="0"/>
+          <a:chExt cx="0" cy="0"/>
+        </a:xfrm>
+      </p:grpSpPr>
+      <p:sp>
+        <p:nvSpPr>
+          <p:cNvPr id="2" name="Cím 1">
+            <a:extLst>
+              <a:ext uri="{FF2B5EF4-FFF2-40B4-BE49-F238E27FC236}">
+                <a16:creationId xmlns:a16="http://schemas.microsoft.com/office/drawing/2014/main" id="{7F901B5D-9267-4B8F-8174-F28652CE1542}"/>
+              </a:ext>
+            </a:extLst>
+          </p:cNvPr>
+          <p:cNvSpPr>
+            <a:spLocks noGrp="1"/>
+          </p:cNvSpPr>
+          <p:nvPr>
+            <p:ph type="title"/>
+          </p:nvPr>
+        </p:nvSpPr>
+        <p:spPr>
+          <a:xfrm>
+            <a:off x="1424133" y="324587"/>
+            <a:ext cx="9396400" cy="643200"/>
+          </a:xfrm>
+        </p:spPr>
+        <p:txBody>
+          <a:bodyPr/>
+          <a:lstStyle/>
+          <a:p>
+            <a:r>
+              <a:rPr lang="hu-HU" sz="3200" dirty="0">
+                <a:solidFill>
+                  <a:schemeClr val="accent1"/>
+                </a:solidFill>
+              </a:rPr>
+              <a:t>Prototípus</a:t>
+            </a:r>
+          </a:p>
+        </p:txBody>
+      </p:sp>
+      <p:pic>
+        <p:nvPicPr>
+          <p:cNvPr id="5" name="Kép 4">
+            <a:extLst>
+              <a:ext uri="{FF2B5EF4-FFF2-40B4-BE49-F238E27FC236}">
+                <a16:creationId xmlns:a16="http://schemas.microsoft.com/office/drawing/2014/main" id="{FB224A48-C0D7-475F-B1E7-B94D07FD2103}"/>
+              </a:ext>
+            </a:extLst>
+          </p:cNvPr>
+          <p:cNvPicPr>
+            <a:picLocks noChangeAspect="1"/>
+          </p:cNvPicPr>
+          <p:nvPr/>
+        </p:nvPicPr>
+        <p:blipFill>
+          <a:blip r:embed="rId2">
+            <a:extLst>
+              <a:ext uri="{28A0092B-C50C-407E-A947-70E740481C1C}">
+                <a14:useLocalDpi xmlns:a14="http://schemas.microsoft.com/office/drawing/2010/main" val="0"/>
+              </a:ext>
+            </a:extLst>
+          </a:blip>
+          <a:stretch>
+            <a:fillRect/>
+          </a:stretch>
+        </p:blipFill>
+        <p:spPr>
+          <a:xfrm>
+            <a:off x="2471737" y="1185862"/>
+            <a:ext cx="7248525" cy="4486275"/>
+          </a:xfrm>
+          <a:prstGeom prst="rect">
+            <a:avLst/>
+          </a:prstGeom>
+        </p:spPr>
+      </p:pic>
+    </p:spTree>
+    <p:extLst>
+      <p:ext uri="{BB962C8B-B14F-4D97-AF65-F5344CB8AC3E}">
+        <p14:creationId xmlns:p14="http://schemas.microsoft.com/office/powerpoint/2010/main" val="3688144676"/>
+      </p:ext>
+    </p:extLst>
+  </p:cSld>
+  <p:clrMapOvr>
+    <a:masterClrMapping/>
+  </p:clrMapOvr>
+</p:sld>
+</file>
+
+<file path=ppt/slides/slide14.xml><?xml version="1.0" encoding="utf-8"?>
+<p:sld xmlns:a="http://schemas.openxmlformats.org/drawingml/2006/main" xmlns:r="http://schemas.openxmlformats.org/officeDocument/2006/relationships" xmlns:p="http://schemas.openxmlformats.org/presentationml/2006/main">
+  <p:cSld>
+    <p:spTree>
+      <p:nvGrpSpPr>
+        <p:cNvPr id="1" name=""/>
+        <p:cNvGrpSpPr/>
+        <p:nvPr/>
+      </p:nvGrpSpPr>
+      <p:grpSpPr>
+        <a:xfrm>
+          <a:off x="0" y="0"/>
+          <a:ext cx="0" cy="0"/>
+          <a:chOff x="0" y="0"/>
+          <a:chExt cx="0" cy="0"/>
+        </a:xfrm>
+      </p:grpSpPr>
+      <p:sp>
+        <p:nvSpPr>
+          <p:cNvPr id="2" name="Cím 1">
+            <a:extLst>
+              <a:ext uri="{FF2B5EF4-FFF2-40B4-BE49-F238E27FC236}">
+                <a16:creationId xmlns:a16="http://schemas.microsoft.com/office/drawing/2014/main" id="{7F901B5D-9267-4B8F-8174-F28652CE1542}"/>
+              </a:ext>
+            </a:extLst>
+          </p:cNvPr>
+          <p:cNvSpPr>
+            <a:spLocks noGrp="1"/>
+          </p:cNvSpPr>
+          <p:nvPr>
+            <p:ph type="title"/>
+          </p:nvPr>
+        </p:nvSpPr>
+        <p:spPr>
+          <a:xfrm>
+            <a:off x="1424133" y="324587"/>
+            <a:ext cx="9396400" cy="643200"/>
+          </a:xfrm>
+        </p:spPr>
+        <p:txBody>
+          <a:bodyPr/>
+          <a:lstStyle/>
+          <a:p>
+            <a:r>
+              <a:rPr lang="hu-HU" sz="3200" dirty="0">
+                <a:solidFill>
+                  <a:schemeClr val="accent1"/>
+                </a:solidFill>
+              </a:rPr>
+              <a:t>Prototípus</a:t>
+            </a:r>
+          </a:p>
+        </p:txBody>
+      </p:sp>
+      <p:pic>
+        <p:nvPicPr>
+          <p:cNvPr id="5" name="Kép 4">
+            <a:extLst>
+              <a:ext uri="{FF2B5EF4-FFF2-40B4-BE49-F238E27FC236}">
+                <a16:creationId xmlns:a16="http://schemas.microsoft.com/office/drawing/2014/main" id="{F126C655-A2C1-48C3-A7E4-D4599883060E}"/>
+              </a:ext>
+            </a:extLst>
+          </p:cNvPr>
+          <p:cNvPicPr>
+            <a:picLocks noChangeAspect="1"/>
+          </p:cNvPicPr>
+          <p:nvPr/>
+        </p:nvPicPr>
+        <p:blipFill>
+          <a:blip r:embed="rId2">
+            <a:extLst>
+              <a:ext uri="{28A0092B-C50C-407E-A947-70E740481C1C}">
+                <a14:useLocalDpi xmlns:a14="http://schemas.microsoft.com/office/drawing/2010/main" val="0"/>
+              </a:ext>
+            </a:extLst>
+          </a:blip>
+          <a:stretch>
+            <a:fillRect/>
+          </a:stretch>
+        </p:blipFill>
+        <p:spPr>
+          <a:xfrm>
+            <a:off x="2471737" y="1185862"/>
+            <a:ext cx="7248525" cy="4486275"/>
+          </a:xfrm>
+          <a:prstGeom prst="rect">
+            <a:avLst/>
+          </a:prstGeom>
+        </p:spPr>
+      </p:pic>
+    </p:spTree>
+    <p:extLst>
+      <p:ext uri="{BB962C8B-B14F-4D97-AF65-F5344CB8AC3E}">
+        <p14:creationId xmlns:p14="http://schemas.microsoft.com/office/powerpoint/2010/main" val="2530639028"/>
+      </p:ext>
+    </p:extLst>
+  </p:cSld>
+  <p:clrMapOvr>
+    <a:masterClrMapping/>
+  </p:clrMapOvr>
+</p:sld>
+</file>
+
+<file path=ppt/slides/slide15.xml><?xml version="1.0" encoding="utf-8"?>
+<p:sld xmlns:a="http://schemas.openxmlformats.org/drawingml/2006/main" xmlns:r="http://schemas.openxmlformats.org/officeDocument/2006/relationships" xmlns:p="http://schemas.openxmlformats.org/presentationml/2006/main">
+  <p:cSld>
+    <p:spTree>
+      <p:nvGrpSpPr>
+        <p:cNvPr id="1" name=""/>
+        <p:cNvGrpSpPr/>
+        <p:nvPr/>
+      </p:nvGrpSpPr>
+      <p:grpSpPr>
+        <a:xfrm>
+          <a:off x="0" y="0"/>
+          <a:ext cx="0" cy="0"/>
+          <a:chOff x="0" y="0"/>
+          <a:chExt cx="0" cy="0"/>
+        </a:xfrm>
+      </p:grpSpPr>
+      <p:sp>
+        <p:nvSpPr>
+          <p:cNvPr id="2" name="Cím 1">
+            <a:extLst>
+              <a:ext uri="{FF2B5EF4-FFF2-40B4-BE49-F238E27FC236}">
                 <a16:creationId xmlns:a16="http://schemas.microsoft.com/office/drawing/2014/main" id="{A35FCB0D-0BCE-4AD0-9876-723B8354404D}"/>
               </a:ext>
             </a:extLst>
@@ -46381,7 +46901,7 @@
 </p:sld>
 </file>
 
-<file path=ppt/slides/slide11.xml><?xml version="1.0" encoding="utf-8"?>
+<file path=ppt/slides/slide16.xml><?xml version="1.0" encoding="utf-8"?>
 <p:sld xmlns:a="http://schemas.openxmlformats.org/drawingml/2006/main" xmlns:r="http://schemas.openxmlformats.org/officeDocument/2006/relationships" xmlns:p="http://schemas.openxmlformats.org/presentationml/2006/main">
   <p:cSld>
     <p:spTree>
@@ -46398,40 +46918,6 @@
           <a:chExt cx="0" cy="0"/>
         </a:xfrm>
       </p:grpSpPr>
-      <p:sp>
-        <p:nvSpPr>
-          <p:cNvPr id="2" name="Cím 1">
-            <a:extLst>
-              <a:ext uri="{FF2B5EF4-FFF2-40B4-BE49-F238E27FC236}">
-                <a16:creationId xmlns:a16="http://schemas.microsoft.com/office/drawing/2014/main" id="{7FDCBB1D-54B1-4097-AA93-FF53257A4F41}"/>
-              </a:ext>
-            </a:extLst>
-          </p:cNvPr>
-          <p:cNvSpPr>
-            <a:spLocks noGrp="1"/>
-          </p:cNvSpPr>
-          <p:nvPr>
-            <p:ph type="title"/>
-          </p:nvPr>
-        </p:nvSpPr>
-        <p:spPr>
-          <a:xfrm>
-            <a:off x="1397800" y="2579254"/>
-            <a:ext cx="9396400" cy="1699493"/>
-          </a:xfrm>
-        </p:spPr>
-        <p:txBody>
-          <a:bodyPr/>
-          <a:lstStyle/>
-          <a:p>
-            <a:endParaRPr lang="hu-HU" sz="8000" dirty="0">
-              <a:solidFill>
-                <a:schemeClr val="accent5"/>
-              </a:solidFill>
-            </a:endParaRPr>
-          </a:p>
-        </p:txBody>
-      </p:sp>
     </p:spTree>
     <p:extLst>
       <p:ext uri="{BB962C8B-B14F-4D97-AF65-F5344CB8AC3E}">
@@ -46445,7 +46931,7 @@
 </p:sld>
 </file>
 
-<file path=ppt/slides/slide12.xml><?xml version="1.0" encoding="utf-8"?>
+<file path=ppt/slides/slide17.xml><?xml version="1.0" encoding="utf-8"?>
 <p:sld xmlns:a="http://schemas.openxmlformats.org/drawingml/2006/main" xmlns:r="http://schemas.openxmlformats.org/officeDocument/2006/relationships" xmlns:p="http://schemas.openxmlformats.org/presentationml/2006/main">
   <p:cSld>
     <p:spTree>
@@ -46476,7 +46962,7 @@
         </p:nvSpPr>
         <p:spPr>
           <a:xfrm>
-            <a:off x="302003" y="5511567"/>
+            <a:off x="402671" y="897622"/>
             <a:ext cx="9202723" cy="923330"/>
           </a:xfrm>
           <a:prstGeom prst="rect">
@@ -46698,7 +47184,7 @@
           <p:nvPr>
             <p:extLst>
               <p:ext uri="{D42A27DB-BD31-4B8C-83A1-F6EECF244321}">
-                <p14:modId xmlns:p14="http://schemas.microsoft.com/office/powerpoint/2010/main" val="2986918828"/>
+                <p14:modId xmlns:p14="http://schemas.microsoft.com/office/powerpoint/2010/main" val="1252170355"/>
               </p:ext>
             </p:extLst>
           </p:nvPr>
@@ -46884,7 +47370,7 @@
                             <a:schemeClr val="bg1"/>
                           </a:solidFill>
                         </a:rPr>
-                        <a:t>Minden</a:t>
+                        <a:t>Kódolás</a:t>
                       </a:r>
                     </a:p>
                   </a:txBody>
@@ -46935,11 +47421,14 @@
                     <a:bodyPr/>
                     <a:lstStyle/>
                     <a:p>
-                      <a:endParaRPr lang="hu-HU" sz="2400" dirty="0">
-                        <a:solidFill>
-                          <a:schemeClr val="bg1"/>
-                        </a:solidFill>
-                      </a:endParaRPr>
+                      <a:r>
+                        <a:rPr lang="hu-HU" sz="2400" dirty="0">
+                          <a:solidFill>
+                            <a:schemeClr val="bg1"/>
+                          </a:solidFill>
+                        </a:rPr>
+                        <a:t>Prezentáció</a:t>
+                      </a:r>
                     </a:p>
                   </a:txBody>
                   <a:tcPr/>
@@ -46957,7 +47446,7 @@
                     <a:lstStyle/>
                     <a:p>
                       <a:r>
-                        <a:rPr lang="hu-HU" sz="2400" noProof="0" dirty="0" err="1">
+                        <a:rPr lang="hu-HU" sz="2400" noProof="0" dirty="0">
                           <a:solidFill>
                             <a:schemeClr val="bg1"/>
                           </a:solidFill>
@@ -46989,11 +47478,14 @@
                     <a:bodyPr/>
                     <a:lstStyle/>
                     <a:p>
-                      <a:endParaRPr lang="hu-HU" sz="2400" dirty="0">
-                        <a:solidFill>
-                          <a:schemeClr val="bg1"/>
-                        </a:solidFill>
-                      </a:endParaRPr>
+                      <a:r>
+                        <a:rPr lang="hu-HU" sz="2400" dirty="0">
+                          <a:solidFill>
+                            <a:schemeClr val="bg1"/>
+                          </a:solidFill>
+                        </a:rPr>
+                        <a:t>Képek</a:t>
+                      </a:r>
                     </a:p>
                   </a:txBody>
                   <a:tcPr/>
@@ -47125,11 +47617,34 @@
           <a:bodyPr/>
           <a:lstStyle/>
           <a:p>
-            <a:endParaRPr lang="hu-HU" sz="2000" dirty="0">
-              <a:solidFill>
-                <a:schemeClr val="bg1"/>
-              </a:solidFill>
-            </a:endParaRPr>
+            <a:r>
+              <a:rPr lang="hu-HU" sz="2000" dirty="0">
+                <a:solidFill>
+                  <a:schemeClr val="bg1"/>
+                </a:solidFill>
+              </a:rPr>
+              <a:t>Projekt vezetése</a:t>
+            </a:r>
+          </a:p>
+          <a:p>
+            <a:r>
+              <a:rPr lang="hu-HU" sz="2000" dirty="0">
+                <a:solidFill>
+                  <a:schemeClr val="bg1"/>
+                </a:solidFill>
+              </a:rPr>
+              <a:t>Feladat osztás</a:t>
+            </a:r>
+          </a:p>
+          <a:p>
+            <a:r>
+              <a:rPr lang="hu-HU" sz="2000" dirty="0">
+                <a:solidFill>
+                  <a:schemeClr val="bg1"/>
+                </a:solidFill>
+              </a:rPr>
+              <a:t>GitHub</a:t>
+            </a:r>
           </a:p>
         </p:txBody>
       </p:sp>
@@ -47201,11 +47716,24 @@
           <a:bodyPr/>
           <a:lstStyle/>
           <a:p>
-            <a:endParaRPr lang="hu-HU" sz="2000" dirty="0">
-              <a:solidFill>
-                <a:schemeClr val="bg1"/>
-              </a:solidFill>
-            </a:endParaRPr>
+            <a:r>
+              <a:rPr lang="hu-HU" sz="2000" dirty="0">
+                <a:solidFill>
+                  <a:schemeClr val="bg1"/>
+                </a:solidFill>
+              </a:rPr>
+              <a:t>Alkalmazás elkészítése</a:t>
+            </a:r>
+          </a:p>
+          <a:p>
+            <a:r>
+              <a:rPr lang="hu-HU" sz="2000" dirty="0">
+                <a:solidFill>
+                  <a:schemeClr val="bg1"/>
+                </a:solidFill>
+              </a:rPr>
+              <a:t>Grafikus alkalmazás létrehozása</a:t>
+            </a:r>
           </a:p>
         </p:txBody>
       </p:sp>
@@ -47271,15 +47799,10 @@
                                 </p:cTn>
                               </p:par>
                               <p:par>
-                                <p:cTn id="7" presetID="1" presetClass="entr" presetSubtype="0" fill="hold" grpId="0" nodeType="withEffect" nodePh="1">
+                                <p:cTn id="7" presetID="1" presetClass="entr" presetSubtype="0" fill="hold" grpId="0" nodeType="withEffect">
                                   <p:stCondLst>
                                     <p:cond delay="0"/>
                                   </p:stCondLst>
-                                  <p:endCondLst>
-                                    <p:cond evt="begin" delay="0">
-                                      <p:tn val="7"/>
-                                    </p:cond>
-                                  </p:endCondLst>
                                   <p:childTnLst>
                                     <p:set>
                                       <p:cBhvr>
@@ -47338,6 +47861,104 @@
                                           </p:stCondLst>
                                         </p:cTn>
                                         <p:tgtEl>
+                                          <p:spTgt spid="7">
+                                            <p:txEl>
+                                              <p:pRg st="1" end="1"/>
+                                            </p:txEl>
+                                          </p:spTgt>
+                                        </p:tgtEl>
+                                        <p:attrNameLst>
+                                          <p:attrName>style.visibility</p:attrName>
+                                        </p:attrNameLst>
+                                      </p:cBhvr>
+                                      <p:to>
+                                        <p:strVal val="visible"/>
+                                      </p:to>
+                                    </p:set>
+                                  </p:childTnLst>
+                                </p:cTn>
+                              </p:par>
+                            </p:childTnLst>
+                          </p:cTn>
+                        </p:par>
+                      </p:childTnLst>
+                    </p:cTn>
+                  </p:par>
+                  <p:par>
+                    <p:cTn id="13" fill="hold">
+                      <p:stCondLst>
+                        <p:cond delay="indefinite"/>
+                      </p:stCondLst>
+                      <p:childTnLst>
+                        <p:par>
+                          <p:cTn id="14" fill="hold">
+                            <p:stCondLst>
+                              <p:cond delay="0"/>
+                            </p:stCondLst>
+                            <p:childTnLst>
+                              <p:par>
+                                <p:cTn id="15" presetID="1" presetClass="entr" presetSubtype="0" fill="hold" grpId="0" nodeType="clickEffect">
+                                  <p:stCondLst>
+                                    <p:cond delay="0"/>
+                                  </p:stCondLst>
+                                  <p:childTnLst>
+                                    <p:set>
+                                      <p:cBhvr>
+                                        <p:cTn id="16" dur="1" fill="hold">
+                                          <p:stCondLst>
+                                            <p:cond delay="0"/>
+                                          </p:stCondLst>
+                                        </p:cTn>
+                                        <p:tgtEl>
+                                          <p:spTgt spid="7">
+                                            <p:txEl>
+                                              <p:pRg st="2" end="2"/>
+                                            </p:txEl>
+                                          </p:spTgt>
+                                        </p:tgtEl>
+                                        <p:attrNameLst>
+                                          <p:attrName>style.visibility</p:attrName>
+                                        </p:attrNameLst>
+                                      </p:cBhvr>
+                                      <p:to>
+                                        <p:strVal val="visible"/>
+                                      </p:to>
+                                    </p:set>
+                                  </p:childTnLst>
+                                </p:cTn>
+                              </p:par>
+                            </p:childTnLst>
+                          </p:cTn>
+                        </p:par>
+                      </p:childTnLst>
+                    </p:cTn>
+                  </p:par>
+                  <p:par>
+                    <p:cTn id="17" fill="hold">
+                      <p:stCondLst>
+                        <p:cond delay="indefinite"/>
+                      </p:stCondLst>
+                      <p:childTnLst>
+                        <p:par>
+                          <p:cTn id="18" fill="hold">
+                            <p:stCondLst>
+                              <p:cond delay="0"/>
+                            </p:stCondLst>
+                            <p:childTnLst>
+                              <p:par>
+                                <p:cTn id="19" presetID="1" presetClass="entr" presetSubtype="0" fill="hold" grpId="0" nodeType="clickEffect">
+                                  <p:stCondLst>
+                                    <p:cond delay="0"/>
+                                  </p:stCondLst>
+                                  <p:childTnLst>
+                                    <p:set>
+                                      <p:cBhvr>
+                                        <p:cTn id="20" dur="1" fill="hold">
+                                          <p:stCondLst>
+                                            <p:cond delay="0"/>
+                                          </p:stCondLst>
+                                        </p:cTn>
+                                        <p:tgtEl>
                                           <p:spTgt spid="8">
                                             <p:txEl>
                                               <p:pRg st="0" end="0"/>
@@ -47356,19 +47977,14 @@
                                 </p:cTn>
                               </p:par>
                               <p:par>
-                                <p:cTn id="13" presetID="1" presetClass="entr" presetSubtype="0" fill="hold" grpId="0" nodeType="withEffect" nodePh="1">
+                                <p:cTn id="21" presetID="1" presetClass="entr" presetSubtype="0" fill="hold" grpId="0" nodeType="withEffect">
                                   <p:stCondLst>
                                     <p:cond delay="0"/>
                                   </p:stCondLst>
-                                  <p:endCondLst>
-                                    <p:cond evt="begin" delay="0">
-                                      <p:tn val="13"/>
-                                    </p:cond>
-                                  </p:endCondLst>
                                   <p:childTnLst>
                                     <p:set>
                                       <p:cBhvr>
-                                        <p:cTn id="14" dur="1" fill="hold">
+                                        <p:cTn id="22" dur="1" fill="hold">
                                           <p:stCondLst>
                                             <p:cond delay="0"/>
                                           </p:stCondLst>
@@ -47377,6 +47993,55 @@
                                           <p:spTgt spid="9">
                                             <p:txEl>
                                               <p:pRg st="0" end="0"/>
+                                            </p:txEl>
+                                          </p:spTgt>
+                                        </p:tgtEl>
+                                        <p:attrNameLst>
+                                          <p:attrName>style.visibility</p:attrName>
+                                        </p:attrNameLst>
+                                      </p:cBhvr>
+                                      <p:to>
+                                        <p:strVal val="visible"/>
+                                      </p:to>
+                                    </p:set>
+                                  </p:childTnLst>
+                                </p:cTn>
+                              </p:par>
+                            </p:childTnLst>
+                          </p:cTn>
+                        </p:par>
+                      </p:childTnLst>
+                    </p:cTn>
+                  </p:par>
+                  <p:par>
+                    <p:cTn id="23" fill="hold">
+                      <p:stCondLst>
+                        <p:cond delay="indefinite"/>
+                      </p:stCondLst>
+                      <p:childTnLst>
+                        <p:par>
+                          <p:cTn id="24" fill="hold">
+                            <p:stCondLst>
+                              <p:cond delay="0"/>
+                            </p:stCondLst>
+                            <p:childTnLst>
+                              <p:par>
+                                <p:cTn id="25" presetID="1" presetClass="entr" presetSubtype="0" fill="hold" grpId="0" nodeType="clickEffect">
+                                  <p:stCondLst>
+                                    <p:cond delay="0"/>
+                                  </p:stCondLst>
+                                  <p:childTnLst>
+                                    <p:set>
+                                      <p:cBhvr>
+                                        <p:cTn id="26" dur="1" fill="hold">
+                                          <p:stCondLst>
+                                            <p:cond delay="0"/>
+                                          </p:stCondLst>
+                                        </p:cTn>
+                                        <p:tgtEl>
+                                          <p:spTgt spid="9">
+                                            <p:txEl>
+                                              <p:pRg st="1" end="1"/>
                                             </p:txEl>
                                           </p:spTgt>
                                         </p:tgtEl>
@@ -47532,6 +48197,24 @@
           <a:bodyPr/>
           <a:lstStyle/>
           <a:p>
+            <a:r>
+              <a:rPr lang="hu-HU" sz="2000" dirty="0">
+                <a:solidFill>
+                  <a:schemeClr val="bg1"/>
+                </a:solidFill>
+              </a:rPr>
+              <a:t>Prezentáció elkészítése</a:t>
+            </a:r>
+          </a:p>
+          <a:p>
+            <a:r>
+              <a:rPr lang="hu-HU" sz="2000" dirty="0">
+                <a:solidFill>
+                  <a:schemeClr val="bg1"/>
+                </a:solidFill>
+              </a:rPr>
+              <a:t>Feladatlap kérdések összeállítása</a:t>
+            </a:r>
             <a:endParaRPr lang="en-US" sz="2000" dirty="0">
               <a:solidFill>
                 <a:schemeClr val="bg1"/>
@@ -47595,11 +48278,34 @@
           <a:bodyPr/>
           <a:lstStyle/>
           <a:p>
-            <a:endParaRPr lang="hu-HU" sz="2000" dirty="0">
-              <a:solidFill>
-                <a:schemeClr val="bg1"/>
-              </a:solidFill>
-            </a:endParaRPr>
+            <a:r>
+              <a:rPr lang="hu-HU" sz="2000" dirty="0">
+                <a:solidFill>
+                  <a:schemeClr val="bg1"/>
+                </a:solidFill>
+              </a:rPr>
+              <a:t>Képek begyűjtése</a:t>
+            </a:r>
+          </a:p>
+          <a:p>
+            <a:r>
+              <a:rPr lang="hu-HU" sz="2000" dirty="0">
+                <a:solidFill>
+                  <a:schemeClr val="bg1"/>
+                </a:solidFill>
+              </a:rPr>
+              <a:t>Vágás</a:t>
+            </a:r>
+          </a:p>
+          <a:p>
+            <a:r>
+              <a:rPr lang="hu-HU" sz="2000" dirty="0">
+                <a:solidFill>
+                  <a:schemeClr val="bg1"/>
+                </a:solidFill>
+              </a:rPr>
+              <a:t>Összeállítás</a:t>
+            </a:r>
           </a:p>
         </p:txBody>
       </p:sp>
@@ -47665,15 +48371,10 @@
                                 </p:cTn>
                               </p:par>
                               <p:par>
-                                <p:cTn id="7" presetID="1" presetClass="entr" presetSubtype="0" fill="hold" grpId="0" nodeType="withEffect" nodePh="1">
+                                <p:cTn id="7" presetID="1" presetClass="entr" presetSubtype="0" fill="hold" grpId="0" nodeType="withEffect">
                                   <p:stCondLst>
                                     <p:cond delay="0"/>
                                   </p:stCondLst>
-                                  <p:endCondLst>
-                                    <p:cond evt="begin" delay="0">
-                                      <p:tn val="7"/>
-                                    </p:cond>
-                                  </p:endCondLst>
                                   <p:childTnLst>
                                     <p:set>
                                       <p:cBhvr>
@@ -47732,6 +48433,55 @@
                                           </p:stCondLst>
                                         </p:cTn>
                                         <p:tgtEl>
+                                          <p:spTgt spid="4">
+                                            <p:txEl>
+                                              <p:pRg st="1" end="1"/>
+                                            </p:txEl>
+                                          </p:spTgt>
+                                        </p:tgtEl>
+                                        <p:attrNameLst>
+                                          <p:attrName>style.visibility</p:attrName>
+                                        </p:attrNameLst>
+                                      </p:cBhvr>
+                                      <p:to>
+                                        <p:strVal val="visible"/>
+                                      </p:to>
+                                    </p:set>
+                                  </p:childTnLst>
+                                </p:cTn>
+                              </p:par>
+                            </p:childTnLst>
+                          </p:cTn>
+                        </p:par>
+                      </p:childTnLst>
+                    </p:cTn>
+                  </p:par>
+                  <p:par>
+                    <p:cTn id="13" fill="hold">
+                      <p:stCondLst>
+                        <p:cond delay="indefinite"/>
+                      </p:stCondLst>
+                      <p:childTnLst>
+                        <p:par>
+                          <p:cTn id="14" fill="hold">
+                            <p:stCondLst>
+                              <p:cond delay="0"/>
+                            </p:stCondLst>
+                            <p:childTnLst>
+                              <p:par>
+                                <p:cTn id="15" presetID="1" presetClass="entr" presetSubtype="0" fill="hold" grpId="0" nodeType="clickEffect">
+                                  <p:stCondLst>
+                                    <p:cond delay="0"/>
+                                  </p:stCondLst>
+                                  <p:childTnLst>
+                                    <p:set>
+                                      <p:cBhvr>
+                                        <p:cTn id="16" dur="1" fill="hold">
+                                          <p:stCondLst>
+                                            <p:cond delay="0"/>
+                                          </p:stCondLst>
+                                        </p:cTn>
+                                        <p:tgtEl>
                                           <p:spTgt spid="5">
                                             <p:txEl>
                                               <p:pRg st="0" end="0"/>
@@ -47750,19 +48500,14 @@
                                 </p:cTn>
                               </p:par>
                               <p:par>
-                                <p:cTn id="13" presetID="1" presetClass="entr" presetSubtype="0" fill="hold" grpId="0" nodeType="withEffect" nodePh="1">
+                                <p:cTn id="17" presetID="1" presetClass="entr" presetSubtype="0" fill="hold" grpId="0" nodeType="withEffect">
                                   <p:stCondLst>
                                     <p:cond delay="0"/>
                                   </p:stCondLst>
-                                  <p:endCondLst>
-                                    <p:cond evt="begin" delay="0">
-                                      <p:tn val="13"/>
-                                    </p:cond>
-                                  </p:endCondLst>
                                   <p:childTnLst>
                                     <p:set>
                                       <p:cBhvr>
-                                        <p:cTn id="14" dur="1" fill="hold">
+                                        <p:cTn id="18" dur="1" fill="hold">
                                           <p:stCondLst>
                                             <p:cond delay="0"/>
                                           </p:stCondLst>
@@ -47771,6 +48516,104 @@
                                           <p:spTgt spid="6">
                                             <p:txEl>
                                               <p:pRg st="0" end="0"/>
+                                            </p:txEl>
+                                          </p:spTgt>
+                                        </p:tgtEl>
+                                        <p:attrNameLst>
+                                          <p:attrName>style.visibility</p:attrName>
+                                        </p:attrNameLst>
+                                      </p:cBhvr>
+                                      <p:to>
+                                        <p:strVal val="visible"/>
+                                      </p:to>
+                                    </p:set>
+                                  </p:childTnLst>
+                                </p:cTn>
+                              </p:par>
+                            </p:childTnLst>
+                          </p:cTn>
+                        </p:par>
+                      </p:childTnLst>
+                    </p:cTn>
+                  </p:par>
+                  <p:par>
+                    <p:cTn id="19" fill="hold">
+                      <p:stCondLst>
+                        <p:cond delay="indefinite"/>
+                      </p:stCondLst>
+                      <p:childTnLst>
+                        <p:par>
+                          <p:cTn id="20" fill="hold">
+                            <p:stCondLst>
+                              <p:cond delay="0"/>
+                            </p:stCondLst>
+                            <p:childTnLst>
+                              <p:par>
+                                <p:cTn id="21" presetID="1" presetClass="entr" presetSubtype="0" fill="hold" grpId="0" nodeType="clickEffect">
+                                  <p:stCondLst>
+                                    <p:cond delay="0"/>
+                                  </p:stCondLst>
+                                  <p:childTnLst>
+                                    <p:set>
+                                      <p:cBhvr>
+                                        <p:cTn id="22" dur="1" fill="hold">
+                                          <p:stCondLst>
+                                            <p:cond delay="0"/>
+                                          </p:stCondLst>
+                                        </p:cTn>
+                                        <p:tgtEl>
+                                          <p:spTgt spid="6">
+                                            <p:txEl>
+                                              <p:pRg st="1" end="1"/>
+                                            </p:txEl>
+                                          </p:spTgt>
+                                        </p:tgtEl>
+                                        <p:attrNameLst>
+                                          <p:attrName>style.visibility</p:attrName>
+                                        </p:attrNameLst>
+                                      </p:cBhvr>
+                                      <p:to>
+                                        <p:strVal val="visible"/>
+                                      </p:to>
+                                    </p:set>
+                                  </p:childTnLst>
+                                </p:cTn>
+                              </p:par>
+                            </p:childTnLst>
+                          </p:cTn>
+                        </p:par>
+                      </p:childTnLst>
+                    </p:cTn>
+                  </p:par>
+                  <p:par>
+                    <p:cTn id="23" fill="hold">
+                      <p:stCondLst>
+                        <p:cond delay="indefinite"/>
+                      </p:stCondLst>
+                      <p:childTnLst>
+                        <p:par>
+                          <p:cTn id="24" fill="hold">
+                            <p:stCondLst>
+                              <p:cond delay="0"/>
+                            </p:stCondLst>
+                            <p:childTnLst>
+                              <p:par>
+                                <p:cTn id="25" presetID="1" presetClass="entr" presetSubtype="0" fill="hold" grpId="0" nodeType="clickEffect">
+                                  <p:stCondLst>
+                                    <p:cond delay="0"/>
+                                  </p:stCondLst>
+                                  <p:childTnLst>
+                                    <p:set>
+                                      <p:cBhvr>
+                                        <p:cTn id="26" dur="1" fill="hold">
+                                          <p:stCondLst>
+                                            <p:cond delay="0"/>
+                                          </p:stCondLst>
+                                        </p:cTn>
+                                        <p:tgtEl>
+                                          <p:spTgt spid="6">
+                                            <p:txEl>
+                                              <p:pRg st="2" end="2"/>
                                             </p:txEl>
                                           </p:spTgt>
                                         </p:tgtEl>
@@ -48040,6 +48883,42 @@
           </a:p>
         </p:txBody>
       </p:sp>
+      <p:pic>
+        <p:nvPicPr>
+          <p:cNvPr id="4" name="Kép 3">
+            <a:extLst>
+              <a:ext uri="{FF2B5EF4-FFF2-40B4-BE49-F238E27FC236}">
+                <a16:creationId xmlns:a16="http://schemas.microsoft.com/office/drawing/2014/main" id="{B55CD2DD-458A-4DEF-9485-6D2BF6E3A947}"/>
+              </a:ext>
+            </a:extLst>
+          </p:cNvPr>
+          <p:cNvPicPr>
+            <a:picLocks noChangeAspect="1"/>
+          </p:cNvPicPr>
+          <p:nvPr/>
+        </p:nvPicPr>
+        <p:blipFill>
+          <a:blip r:embed="rId2">
+            <a:extLst>
+              <a:ext uri="{28A0092B-C50C-407E-A947-70E740481C1C}">
+                <a14:useLocalDpi xmlns:a14="http://schemas.microsoft.com/office/drawing/2010/main" val="0"/>
+              </a:ext>
+            </a:extLst>
+          </a:blip>
+          <a:stretch>
+            <a:fillRect/>
+          </a:stretch>
+        </p:blipFill>
+        <p:spPr>
+          <a:xfrm>
+            <a:off x="5408103" y="1291606"/>
+            <a:ext cx="5690325" cy="3521870"/>
+          </a:xfrm>
+          <a:prstGeom prst="rect">
+            <a:avLst/>
+          </a:prstGeom>
+        </p:spPr>
+      </p:pic>
     </p:spTree>
     <p:extLst>
       <p:ext uri="{BB962C8B-B14F-4D97-AF65-F5344CB8AC3E}">
@@ -48203,7 +49082,7 @@
           <p:cNvPr id="2" name="Cím 1">
             <a:extLst>
               <a:ext uri="{FF2B5EF4-FFF2-40B4-BE49-F238E27FC236}">
-                <a16:creationId xmlns:a16="http://schemas.microsoft.com/office/drawing/2014/main" id="{7BB18914-4588-4969-8C98-630F4DC6919A}"/>
+                <a16:creationId xmlns:a16="http://schemas.microsoft.com/office/drawing/2014/main" id="{0A5A7B65-658E-4848-9AC5-557A7B54B122}"/>
               </a:ext>
             </a:extLst>
           </p:cNvPr>
@@ -48214,65 +49093,33 @@
             <p:ph type="title"/>
           </p:nvPr>
         </p:nvSpPr>
-        <p:spPr/>
+        <p:spPr>
+          <a:xfrm>
+            <a:off x="4210668" y="559192"/>
+            <a:ext cx="9396400" cy="643200"/>
+          </a:xfrm>
+        </p:spPr>
         <p:txBody>
           <a:bodyPr/>
           <a:lstStyle/>
           <a:p>
             <a:r>
-              <a:rPr lang="en-US" dirty="0" err="1">
+              <a:rPr lang="hu-HU" sz="3200" dirty="0">
                 <a:solidFill>
                   <a:schemeClr val="accent1"/>
                 </a:solidFill>
               </a:rPr>
-              <a:t>Felhasznált</a:t>
+              <a:t>Tervezés: Drótváz</a:t>
             </a:r>
-            <a:r>
-              <a:rPr lang="en-US" dirty="0">
-                <a:solidFill>
-                  <a:schemeClr val="accent1"/>
-                </a:solidFill>
-              </a:rPr>
-              <a:t> e</a:t>
-            </a:r>
-            <a:r>
-              <a:rPr lang="hu-HU" dirty="0" err="1">
-                <a:solidFill>
-                  <a:schemeClr val="accent1"/>
-                </a:solidFill>
-              </a:rPr>
-              <a:t>szközök</a:t>
-            </a:r>
-            <a:r>
-              <a:rPr lang="en-US" dirty="0">
-                <a:solidFill>
-                  <a:schemeClr val="accent1"/>
-                </a:solidFill>
-              </a:rPr>
-              <a:t>/</a:t>
-            </a:r>
-            <a:r>
-              <a:rPr lang="en-US" dirty="0" err="1">
-                <a:solidFill>
-                  <a:schemeClr val="accent1"/>
-                </a:solidFill>
-              </a:rPr>
-              <a:t>technológiák</a:t>
-            </a:r>
-            <a:endParaRPr lang="hu-HU" dirty="0">
-              <a:solidFill>
-                <a:schemeClr val="accent1"/>
-              </a:solidFill>
-            </a:endParaRPr>
           </a:p>
         </p:txBody>
       </p:sp>
       <p:sp>
         <p:nvSpPr>
-          <p:cNvPr id="3" name="Tartalom helye 2">
+          <p:cNvPr id="7" name="Tartalom helye 6">
             <a:extLst>
               <a:ext uri="{FF2B5EF4-FFF2-40B4-BE49-F238E27FC236}">
-                <a16:creationId xmlns:a16="http://schemas.microsoft.com/office/drawing/2014/main" id="{959D303D-955F-44EE-A933-4781BDAC1893}"/>
+                <a16:creationId xmlns:a16="http://schemas.microsoft.com/office/drawing/2014/main" id="{7FAA36C3-FB0B-4335-B9A8-06D9B39DDE95}"/>
               </a:ext>
             </a:extLst>
           </p:cNvPr>
@@ -48285,28 +49132,192 @@
         </p:nvSpPr>
         <p:spPr>
           <a:xfrm>
-            <a:off x="1424133" y="2260599"/>
-            <a:ext cx="9396400" cy="3822959"/>
+            <a:off x="736236" y="1226949"/>
+            <a:ext cx="4671867" cy="3586527"/>
           </a:xfrm>
         </p:spPr>
         <p:txBody>
           <a:bodyPr>
-            <a:normAutofit/>
+            <a:normAutofit fontScale="85000" lnSpcReduction="20000"/>
           </a:bodyPr>
           <a:lstStyle/>
           <a:p>
-            <a:endParaRPr lang="hu-HU" sz="2000" dirty="0">
+            <a:pPr marL="158750" indent="0">
+              <a:buNone/>
+            </a:pPr>
+            <a:r>
+              <a:rPr lang="hu-HU" sz="2400" dirty="0">
+                <a:solidFill>
+                  <a:schemeClr val="bg1"/>
+                </a:solidFill>
+              </a:rPr>
+              <a:t>A </a:t>
+            </a:r>
+            <a:r>
+              <a:rPr lang="hu-HU" sz="2400" dirty="0">
+                <a:solidFill>
+                  <a:schemeClr val="accent1"/>
+                </a:solidFill>
+              </a:rPr>
+              <a:t>drótváz</a:t>
+            </a:r>
+            <a:r>
+              <a:rPr lang="hu-HU" sz="2400" dirty="0">
+                <a:solidFill>
+                  <a:schemeClr val="bg1"/>
+                </a:solidFill>
+              </a:rPr>
+              <a:t> a weboldal felépítését ábrázolja</a:t>
+            </a:r>
+            <a:r>
+              <a:rPr lang="en-US" sz="2400" dirty="0">
+                <a:solidFill>
+                  <a:schemeClr val="bg1"/>
+                </a:solidFill>
+              </a:rPr>
+              <a:t>.</a:t>
+            </a:r>
+          </a:p>
+          <a:p>
+            <a:pPr marL="158750" indent="0">
+              <a:buNone/>
+            </a:pPr>
+            <a:endParaRPr lang="en-US" sz="2400" dirty="0">
               <a:solidFill>
-                <a:srgbClr val="94EA22"/>
+                <a:schemeClr val="bg1"/>
               </a:solidFill>
             </a:endParaRPr>
           </a:p>
+          <a:p>
+            <a:pPr marL="158750" indent="0">
+              <a:buNone/>
+            </a:pPr>
+            <a:r>
+              <a:rPr lang="hu-HU" sz="2000" dirty="0">
+                <a:solidFill>
+                  <a:schemeClr val="bg1"/>
+                </a:solidFill>
+              </a:rPr>
+              <a:t>A </a:t>
+            </a:r>
+            <a:r>
+              <a:rPr lang="hu-HU" sz="2000" dirty="0">
+                <a:solidFill>
+                  <a:schemeClr val="accent1"/>
+                </a:solidFill>
+              </a:rPr>
+              <a:t>drótváz</a:t>
+            </a:r>
+            <a:r>
+              <a:rPr lang="hu-HU" sz="2000" dirty="0">
+                <a:solidFill>
+                  <a:schemeClr val="bg1"/>
+                </a:solidFill>
+              </a:rPr>
+              <a:t> segítségével történik a weboldal strukturális felépítése, ezen a ponton már figyelembe vettük a Bootstrap által nyújtott lehetőségeket.</a:t>
+            </a:r>
+          </a:p>
+          <a:p>
+            <a:pPr marL="158750" indent="0">
+              <a:buNone/>
+            </a:pPr>
+            <a:endParaRPr lang="en-US" sz="2400" dirty="0">
+              <a:solidFill>
+                <a:schemeClr val="bg1"/>
+              </a:solidFill>
+            </a:endParaRPr>
+          </a:p>
+          <a:p>
+            <a:pPr marL="158750" indent="0">
+              <a:buNone/>
+            </a:pPr>
+            <a:endParaRPr lang="en-US" sz="2400" i="1" u="sng" dirty="0">
+              <a:solidFill>
+                <a:schemeClr val="bg1"/>
+              </a:solidFill>
+            </a:endParaRPr>
+          </a:p>
+          <a:p>
+            <a:pPr marL="158750" indent="0">
+              <a:buNone/>
+            </a:pPr>
+            <a:endParaRPr lang="en-US" sz="2400" i="1" u="sng" dirty="0">
+              <a:solidFill>
+                <a:schemeClr val="bg1"/>
+              </a:solidFill>
+            </a:endParaRPr>
+          </a:p>
+          <a:p>
+            <a:pPr marL="158750" indent="0">
+              <a:buNone/>
+            </a:pPr>
+            <a:r>
+              <a:rPr lang="hu-HU" sz="2400" i="1" u="sng" dirty="0">
+                <a:solidFill>
+                  <a:schemeClr val="bg1"/>
+                </a:solidFill>
+              </a:rPr>
+              <a:t>A </a:t>
+            </a:r>
+            <a:r>
+              <a:rPr lang="hu-HU" sz="2400" i="1" u="sng" dirty="0">
+                <a:solidFill>
+                  <a:schemeClr val="accent1"/>
+                </a:solidFill>
+              </a:rPr>
+              <a:t>drótvázat</a:t>
+            </a:r>
+            <a:r>
+              <a:rPr lang="hu-HU" sz="2400" i="1" u="sng" dirty="0">
+                <a:solidFill>
+                  <a:schemeClr val="bg1"/>
+                </a:solidFill>
+              </a:rPr>
+              <a:t> a megrendelő elfogadta.</a:t>
+            </a:r>
+          </a:p>
         </p:txBody>
       </p:sp>
+      <p:pic>
+        <p:nvPicPr>
+          <p:cNvPr id="6" name="Kép 5">
+            <a:extLst>
+              <a:ext uri="{FF2B5EF4-FFF2-40B4-BE49-F238E27FC236}">
+                <a16:creationId xmlns:a16="http://schemas.microsoft.com/office/drawing/2014/main" id="{3228E85B-1C9A-4770-8774-7E6DA1451EC9}"/>
+              </a:ext>
+            </a:extLst>
+          </p:cNvPr>
+          <p:cNvPicPr>
+            <a:picLocks noChangeAspect="1"/>
+          </p:cNvPicPr>
+          <p:nvPr/>
+        </p:nvPicPr>
+        <p:blipFill>
+          <a:blip r:embed="rId2">
+            <a:extLst>
+              <a:ext uri="{28A0092B-C50C-407E-A947-70E740481C1C}">
+                <a14:useLocalDpi xmlns:a14="http://schemas.microsoft.com/office/drawing/2010/main" val="0"/>
+              </a:ext>
+            </a:extLst>
+          </a:blip>
+          <a:stretch>
+            <a:fillRect/>
+          </a:stretch>
+        </p:blipFill>
+        <p:spPr>
+          <a:xfrm>
+            <a:off x="5052567" y="1307506"/>
+            <a:ext cx="5905956" cy="3655329"/>
+          </a:xfrm>
+          <a:prstGeom prst="rect">
+            <a:avLst/>
+          </a:prstGeom>
+        </p:spPr>
+      </p:pic>
     </p:spTree>
     <p:extLst>
       <p:ext uri="{BB962C8B-B14F-4D97-AF65-F5344CB8AC3E}">
-        <p14:creationId xmlns:p14="http://schemas.microsoft.com/office/powerpoint/2010/main" val="2500329435"/>
+        <p14:creationId xmlns:p14="http://schemas.microsoft.com/office/powerpoint/2010/main" val="975539402"/>
       </p:ext>
     </p:extLst>
   </p:cSld>
@@ -48334,15 +49345,10 @@
                             </p:stCondLst>
                             <p:childTnLst>
                               <p:par>
-                                <p:cTn id="5" presetID="1" presetClass="entr" presetSubtype="0" fill="hold" nodeType="clickEffect" nodePh="1">
+                                <p:cTn id="5" presetID="1" presetClass="entr" presetSubtype="0" fill="hold" nodeType="clickEffect">
                                   <p:stCondLst>
                                     <p:cond delay="0"/>
                                   </p:stCondLst>
-                                  <p:endCondLst>
-                                    <p:cond evt="begin" delay="0">
-                                      <p:tn val="5"/>
-                                    </p:cond>
-                                  </p:endCondLst>
                                   <p:childTnLst>
                                     <p:set>
                                       <p:cBhvr>
@@ -48352,9 +49358,58 @@
                                           </p:stCondLst>
                                         </p:cTn>
                                         <p:tgtEl>
-                                          <p:spTgt spid="3">
+                                          <p:spTgt spid="7">
                                             <p:txEl>
-                                              <p:pRg st="0" end="0"/>
+                                              <p:pRg st="2" end="2"/>
+                                            </p:txEl>
+                                          </p:spTgt>
+                                        </p:tgtEl>
+                                        <p:attrNameLst>
+                                          <p:attrName>style.visibility</p:attrName>
+                                        </p:attrNameLst>
+                                      </p:cBhvr>
+                                      <p:to>
+                                        <p:strVal val="visible"/>
+                                      </p:to>
+                                    </p:set>
+                                  </p:childTnLst>
+                                </p:cTn>
+                              </p:par>
+                            </p:childTnLst>
+                          </p:cTn>
+                        </p:par>
+                      </p:childTnLst>
+                    </p:cTn>
+                  </p:par>
+                  <p:par>
+                    <p:cTn id="7" fill="hold">
+                      <p:stCondLst>
+                        <p:cond delay="indefinite"/>
+                      </p:stCondLst>
+                      <p:childTnLst>
+                        <p:par>
+                          <p:cTn id="8" fill="hold">
+                            <p:stCondLst>
+                              <p:cond delay="0"/>
+                            </p:stCondLst>
+                            <p:childTnLst>
+                              <p:par>
+                                <p:cTn id="9" presetID="1" presetClass="entr" presetSubtype="0" fill="hold" nodeType="clickEffect">
+                                  <p:stCondLst>
+                                    <p:cond delay="0"/>
+                                  </p:stCondLst>
+                                  <p:childTnLst>
+                                    <p:set>
+                                      <p:cBhvr>
+                                        <p:cTn id="10" dur="1" fill="hold">
+                                          <p:stCondLst>
+                                            <p:cond delay="0"/>
+                                          </p:stCondLst>
+                                        </p:cTn>
+                                        <p:tgtEl>
+                                          <p:spTgt spid="7">
+                                            <p:txEl>
+                                              <p:pRg st="6" end="6"/>
                                             </p:txEl>
                                           </p:spTgt>
                                         </p:tgtEl>

</xml_diff>